<commit_message>
Add Day 3 + small changes in day 1,2
</commit_message>
<xml_diff>
--- a/Agenda.pptx
+++ b/Agenda.pptx
@@ -277,7 +277,7 @@
           <a:p>
             <a:fld id="{DB0C2FE5-8FB8-574D-A4C9-32472DC451E0}" type="datetimeFigureOut">
               <a:rPr lang="pl-PL" smtClean="0"/>
-              <a:t>02.09.2021</a:t>
+              <a:t>17.09.2021</a:t>
             </a:fld>
             <a:endParaRPr lang="pl-PL"/>
           </a:p>
@@ -477,7 +477,7 @@
           <a:p>
             <a:fld id="{DB0C2FE5-8FB8-574D-A4C9-32472DC451E0}" type="datetimeFigureOut">
               <a:rPr lang="pl-PL" smtClean="0"/>
-              <a:t>02.09.2021</a:t>
+              <a:t>17.09.2021</a:t>
             </a:fld>
             <a:endParaRPr lang="pl-PL"/>
           </a:p>
@@ -687,7 +687,7 @@
           <a:p>
             <a:fld id="{DB0C2FE5-8FB8-574D-A4C9-32472DC451E0}" type="datetimeFigureOut">
               <a:rPr lang="pl-PL" smtClean="0"/>
-              <a:t>02.09.2021</a:t>
+              <a:t>17.09.2021</a:t>
             </a:fld>
             <a:endParaRPr lang="pl-PL"/>
           </a:p>
@@ -887,7 +887,7 @@
           <a:p>
             <a:fld id="{DB0C2FE5-8FB8-574D-A4C9-32472DC451E0}" type="datetimeFigureOut">
               <a:rPr lang="pl-PL" smtClean="0"/>
-              <a:t>02.09.2021</a:t>
+              <a:t>17.09.2021</a:t>
             </a:fld>
             <a:endParaRPr lang="pl-PL"/>
           </a:p>
@@ -1163,7 +1163,7 @@
           <a:p>
             <a:fld id="{DB0C2FE5-8FB8-574D-A4C9-32472DC451E0}" type="datetimeFigureOut">
               <a:rPr lang="pl-PL" smtClean="0"/>
-              <a:t>02.09.2021</a:t>
+              <a:t>17.09.2021</a:t>
             </a:fld>
             <a:endParaRPr lang="pl-PL"/>
           </a:p>
@@ -1431,7 +1431,7 @@
           <a:p>
             <a:fld id="{DB0C2FE5-8FB8-574D-A4C9-32472DC451E0}" type="datetimeFigureOut">
               <a:rPr lang="pl-PL" smtClean="0"/>
-              <a:t>02.09.2021</a:t>
+              <a:t>17.09.2021</a:t>
             </a:fld>
             <a:endParaRPr lang="pl-PL"/>
           </a:p>
@@ -1846,7 +1846,7 @@
           <a:p>
             <a:fld id="{DB0C2FE5-8FB8-574D-A4C9-32472DC451E0}" type="datetimeFigureOut">
               <a:rPr lang="pl-PL" smtClean="0"/>
-              <a:t>02.09.2021</a:t>
+              <a:t>17.09.2021</a:t>
             </a:fld>
             <a:endParaRPr lang="pl-PL"/>
           </a:p>
@@ -1988,7 +1988,7 @@
           <a:p>
             <a:fld id="{DB0C2FE5-8FB8-574D-A4C9-32472DC451E0}" type="datetimeFigureOut">
               <a:rPr lang="pl-PL" smtClean="0"/>
-              <a:t>02.09.2021</a:t>
+              <a:t>17.09.2021</a:t>
             </a:fld>
             <a:endParaRPr lang="pl-PL"/>
           </a:p>
@@ -2101,7 +2101,7 @@
           <a:p>
             <a:fld id="{DB0C2FE5-8FB8-574D-A4C9-32472DC451E0}" type="datetimeFigureOut">
               <a:rPr lang="pl-PL" smtClean="0"/>
-              <a:t>02.09.2021</a:t>
+              <a:t>17.09.2021</a:t>
             </a:fld>
             <a:endParaRPr lang="pl-PL"/>
           </a:p>
@@ -2414,7 +2414,7 @@
           <a:p>
             <a:fld id="{DB0C2FE5-8FB8-574D-A4C9-32472DC451E0}" type="datetimeFigureOut">
               <a:rPr lang="pl-PL" smtClean="0"/>
-              <a:t>02.09.2021</a:t>
+              <a:t>17.09.2021</a:t>
             </a:fld>
             <a:endParaRPr lang="pl-PL"/>
           </a:p>
@@ -2703,7 +2703,7 @@
           <a:p>
             <a:fld id="{DB0C2FE5-8FB8-574D-A4C9-32472DC451E0}" type="datetimeFigureOut">
               <a:rPr lang="pl-PL" smtClean="0"/>
-              <a:t>02.09.2021</a:t>
+              <a:t>17.09.2021</a:t>
             </a:fld>
             <a:endParaRPr lang="pl-PL"/>
           </a:p>
@@ -2946,7 +2946,7 @@
           <a:p>
             <a:fld id="{DB0C2FE5-8FB8-574D-A4C9-32472DC451E0}" type="datetimeFigureOut">
               <a:rPr lang="pl-PL" smtClean="0"/>
-              <a:t>02.09.2021</a:t>
+              <a:t>17.09.2021</a:t>
             </a:fld>
             <a:endParaRPr lang="pl-PL"/>
           </a:p>
@@ -11033,7 +11033,7 @@
                   <a:schemeClr val="bg1"/>
                 </a:solidFill>
               </a:rPr>
-              <a:t>Infrastructure</a:t>
+              <a:t>Deployment models</a:t>
             </a:r>
           </a:p>
           <a:p>
@@ -11048,7 +11048,7 @@
                   <a:schemeClr val="bg1"/>
                 </a:solidFill>
               </a:rPr>
-              <a:t>Cloud</a:t>
+              <a:t>Operations</a:t>
             </a:r>
           </a:p>
           <a:p>
@@ -11063,65 +11063,8 @@
                   <a:schemeClr val="bg1"/>
                 </a:solidFill>
               </a:rPr>
-              <a:t>Deployment models</a:t>
-            </a:r>
-          </a:p>
-          <a:p>
-            <a:pPr>
-              <a:buClr>
-                <a:schemeClr val="accent1"/>
-              </a:buClr>
-            </a:pPr>
-            <a:r>
-              <a:rPr lang="en-GB" sz="1600" dirty="0">
-                <a:solidFill>
-                  <a:schemeClr val="bg1"/>
-                </a:solidFill>
-              </a:rPr>
-              <a:t>Operations</a:t>
-            </a:r>
-          </a:p>
-          <a:p>
-            <a:pPr>
-              <a:buClr>
-                <a:schemeClr val="accent1"/>
-              </a:buClr>
-            </a:pPr>
-            <a:r>
-              <a:rPr lang="en-GB" sz="1600" dirty="0">
-                <a:solidFill>
-                  <a:schemeClr val="bg1"/>
-                </a:solidFill>
-              </a:rPr>
               <a:t>Security</a:t>
             </a:r>
-          </a:p>
-          <a:p>
-            <a:pPr>
-              <a:buClr>
-                <a:schemeClr val="accent1"/>
-              </a:buClr>
-            </a:pPr>
-            <a:r>
-              <a:rPr lang="en-GB" sz="1600" dirty="0">
-                <a:solidFill>
-                  <a:schemeClr val="bg1"/>
-                </a:solidFill>
-              </a:rPr>
-              <a:t>Refactoring of Legacy Systems</a:t>
-            </a:r>
-          </a:p>
-          <a:p>
-            <a:pPr>
-              <a:buClr>
-                <a:schemeClr val="accent1"/>
-              </a:buClr>
-            </a:pPr>
-            <a:endParaRPr lang="en-GB" sz="1600" dirty="0">
-              <a:solidFill>
-                <a:schemeClr val="bg1"/>
-              </a:solidFill>
-            </a:endParaRPr>
           </a:p>
         </p:txBody>
       </p:sp>

</xml_diff>